<commit_message>
correcciones en las diapositivas, nombres y apellidos de tesistas
</commit_message>
<xml_diff>
--- a/diapositivas Andrés Vega.pptx
+++ b/diapositivas Andrés Vega.pptx
@@ -5,10 +5,10 @@
     <p:sldMasterId id="2147483711" r:id="rId1"/>
   </p:sldMasterIdLst>
   <p:notesMasterIdLst>
-    <p:notesMasterId r:id="rId10"/>
+    <p:notesMasterId r:id="rId11"/>
   </p:notesMasterIdLst>
   <p:handoutMasterIdLst>
-    <p:handoutMasterId r:id="rId11"/>
+    <p:handoutMasterId r:id="rId12"/>
   </p:handoutMasterIdLst>
   <p:sldIdLst>
     <p:sldId id="256" r:id="rId2"/>
@@ -19,6 +19,7 @@
     <p:sldId id="273" r:id="rId7"/>
     <p:sldId id="275" r:id="rId8"/>
     <p:sldId id="276" r:id="rId9"/>
+    <p:sldId id="277" r:id="rId10"/>
   </p:sldIdLst>
   <p:sldSz cx="9144000" cy="6858000" type="screen4x3"/>
   <p:notesSz cx="6858000" cy="9144000"/>
@@ -119,10 +120,10 @@
   </p:defaultTextStyle>
   <p:extLst>
     <p:ext uri="{EFAFB233-063F-42B5-8137-9DF3F51BA10A}">
-      <p15:sldGuideLst xmlns="" xmlns:p15="http://schemas.microsoft.com/office/powerpoint/2012/main"/>
+      <p15:sldGuideLst xmlns:p15="http://schemas.microsoft.com/office/powerpoint/2012/main" xmlns=""/>
     </p:ext>
     <p:ext uri="{2D200454-40CA-4A62-9FC3-DE9A4176ACB9}">
-      <p15:notesGuideLst xmlns="" xmlns:p15="http://schemas.microsoft.com/office/powerpoint/2012/main"/>
+      <p15:notesGuideLst xmlns:p15="http://schemas.microsoft.com/office/powerpoint/2012/main" xmlns=""/>
     </p:ext>
   </p:extLst>
 </p:presentation>
@@ -8254,7 +8255,19 @@
         <a:p>
           <a:r>
             <a:rPr lang="es-VE" dirty="0" smtClean="0"/>
-            <a:t>Lujan y Rosario (</a:t>
+            <a:t>Lujan </a:t>
+          </a:r>
+          <a:r>
+            <a:rPr lang="es-VE" dirty="0" smtClean="0"/>
+            <a:t>Alberto y </a:t>
+          </a:r>
+          <a:r>
+            <a:rPr lang="es-VE" dirty="0" smtClean="0"/>
+            <a:t>Rosario </a:t>
+          </a:r>
+          <a:r>
+            <a:rPr lang="es-VE" dirty="0" smtClean="0"/>
+            <a:t>César (</a:t>
           </a:r>
           <a:r>
             <a:rPr lang="es-ES" dirty="0" smtClean="0"/>
@@ -8299,7 +8312,23 @@
         <a:p>
           <a:r>
             <a:rPr lang="es-VE" dirty="0" smtClean="0"/>
-            <a:t>Burgos y Rodríguez (</a:t>
+            <a:t>Burgos </a:t>
+          </a:r>
+          <a:r>
+            <a:rPr lang="es-VE" dirty="0" err="1" smtClean="0"/>
+            <a:t>Miluska</a:t>
+          </a:r>
+          <a:r>
+            <a:rPr lang="es-VE" dirty="0" smtClean="0"/>
+            <a:t> </a:t>
+          </a:r>
+          <a:r>
+            <a:rPr lang="es-VE" dirty="0" smtClean="0"/>
+            <a:t>y Rodríguez </a:t>
+          </a:r>
+          <a:r>
+            <a:rPr lang="es-VE" dirty="0" smtClean="0"/>
+            <a:t> Vanessa (</a:t>
           </a:r>
           <a:r>
             <a:rPr lang="es-ES" dirty="0" smtClean="0"/>
@@ -8352,7 +8381,27 @@
         <a:p>
           <a:r>
             <a:rPr lang="es-VE" dirty="0" smtClean="0"/>
-            <a:t>Urbina y Vera (2018) </a:t>
+            <a:t>Urbina José </a:t>
+          </a:r>
+          <a:r>
+            <a:rPr lang="es-VE" dirty="0" smtClean="0"/>
+            <a:t>y </a:t>
+          </a:r>
+          <a:r>
+            <a:rPr lang="es-VE" dirty="0" smtClean="0"/>
+            <a:t>Vera </a:t>
+          </a:r>
+          <a:r>
+            <a:rPr lang="es-VE" dirty="0" err="1" smtClean="0"/>
+            <a:t>Heysen</a:t>
+          </a:r>
+          <a:r>
+            <a:rPr lang="es-VE" dirty="0" smtClean="0"/>
+            <a:t> </a:t>
+          </a:r>
+          <a:r>
+            <a:rPr lang="es-VE" dirty="0" smtClean="0"/>
+            <a:t>(2018) </a:t>
           </a:r>
           <a:r>
             <a:rPr lang="es-ES" dirty="0" smtClean="0"/>
@@ -8401,7 +8450,15 @@
         <a:p>
           <a:r>
             <a:rPr lang="es-ES" sz="1100" dirty="0" smtClean="0"/>
-            <a:t>González (2016) "</a:t>
+            <a:t>González </a:t>
+          </a:r>
+          <a:r>
+            <a:rPr lang="es-ES" sz="1100" dirty="0" smtClean="0"/>
+            <a:t>Carlos (2016</a:t>
+          </a:r>
+          <a:r>
+            <a:rPr lang="es-ES" sz="1100" dirty="0" smtClean="0"/>
+            <a:t>) "</a:t>
           </a:r>
           <a:r>
             <a:rPr lang="es-ES" sz="1100" b="1" dirty="0" smtClean="0"/>
@@ -10625,6 +10682,13 @@
         </dgm:presLayoutVars>
       </dgm:prSet>
       <dgm:spPr/>
+      <dgm:t>
+        <a:bodyPr/>
+        <a:lstStyle/>
+        <a:p>
+          <a:endParaRPr lang="es-ES"/>
+        </a:p>
+      </dgm:t>
     </dgm:pt>
     <dgm:pt modelId="{4EAA8E0D-918E-4874-8714-D4DFAC326778}" type="pres">
       <dgm:prSet presAssocID="{43AF0EB3-EACA-4E3C-9394-B499245D299C}" presName="sp" presStyleCnt="0"/>
@@ -10688,6 +10752,13 @@
         </dgm:presLayoutVars>
       </dgm:prSet>
       <dgm:spPr/>
+      <dgm:t>
+        <a:bodyPr/>
+        <a:lstStyle/>
+        <a:p>
+          <a:endParaRPr lang="es-ES"/>
+        </a:p>
+      </dgm:t>
     </dgm:pt>
     <dgm:pt modelId="{1CD4CD80-E499-48E3-8549-D068C5B1018D}" type="pres">
       <dgm:prSet presAssocID="{1DDFB73C-CF84-4F97-BF87-0347CAEEFBCD}" presName="childTextArrow" presStyleLbl="fgAccFollowNode1" presStyleIdx="9" presStyleCnt="10">
@@ -10696,6 +10767,13 @@
         </dgm:presLayoutVars>
       </dgm:prSet>
       <dgm:spPr/>
+      <dgm:t>
+        <a:bodyPr/>
+        <a:lstStyle/>
+        <a:p>
+          <a:endParaRPr lang="es-ES"/>
+        </a:p>
+      </dgm:t>
     </dgm:pt>
   </dgm:ptLst>
   <dgm:cxnLst>
@@ -12877,8 +12955,8 @@
       </dsp:nvSpPr>
       <dsp:spPr>
         <a:xfrm>
-          <a:off x="5107026" y="1624704"/>
-          <a:ext cx="2682307" cy="1609384"/>
+          <a:off x="5285572" y="1623854"/>
+          <a:ext cx="2683723" cy="1610234"/>
         </a:xfrm>
         <a:prstGeom prst="hexagon">
           <a:avLst/>
@@ -12958,7 +13036,19 @@
           </a:pPr>
           <a:r>
             <a:rPr lang="es-VE" sz="1100" kern="1200" dirty="0" smtClean="0"/>
-            <a:t>Lujan y Rosario (</a:t>
+            <a:t>Lujan </a:t>
+          </a:r>
+          <a:r>
+            <a:rPr lang="es-VE" sz="1100" kern="1200" dirty="0" smtClean="0"/>
+            <a:t>Alberto y </a:t>
+          </a:r>
+          <a:r>
+            <a:rPr lang="es-VE" sz="1100" kern="1200" dirty="0" smtClean="0"/>
+            <a:t>Rosario </a:t>
+          </a:r>
+          <a:r>
+            <a:rPr lang="es-VE" sz="1100" kern="1200" dirty="0" smtClean="0"/>
+            <a:t>César (</a:t>
           </a:r>
           <a:r>
             <a:rPr lang="es-ES" sz="1100" kern="1200" dirty="0" smtClean="0"/>
@@ -12972,8 +13062,8 @@
         </a:p>
       </dsp:txBody>
       <dsp:txXfrm>
-        <a:off x="5107026" y="1624704"/>
-        <a:ext cx="2682307" cy="1609384"/>
+        <a:off x="5285572" y="1623854"/>
+        <a:ext cx="2683723" cy="1610234"/>
       </dsp:txXfrm>
     </dsp:sp>
     <dsp:sp modelId="{83A4EDF4-25F2-42AF-9870-F57D789A5EA1}">
@@ -12983,8 +13073,8 @@
       </dsp:nvSpPr>
       <dsp:spPr>
         <a:xfrm>
-          <a:off x="2207952" y="1624704"/>
-          <a:ext cx="2682307" cy="1609384"/>
+          <a:off x="2384967" y="1623854"/>
+          <a:ext cx="2683723" cy="1610234"/>
         </a:xfrm>
         <a:prstGeom prst="hexagon">
           <a:avLst/>
@@ -13064,7 +13154,23 @@
           </a:pPr>
           <a:r>
             <a:rPr lang="es-VE" sz="1100" kern="1200" dirty="0" smtClean="0"/>
-            <a:t>Burgos y Rodríguez (</a:t>
+            <a:t>Burgos </a:t>
+          </a:r>
+          <a:r>
+            <a:rPr lang="es-VE" sz="1100" kern="1200" dirty="0" err="1" smtClean="0"/>
+            <a:t>Miluska</a:t>
+          </a:r>
+          <a:r>
+            <a:rPr lang="es-VE" sz="1100" kern="1200" dirty="0" smtClean="0"/>
+            <a:t> </a:t>
+          </a:r>
+          <a:r>
+            <a:rPr lang="es-VE" sz="1100" kern="1200" dirty="0" smtClean="0"/>
+            <a:t>y Rodríguez </a:t>
+          </a:r>
+          <a:r>
+            <a:rPr lang="es-VE" sz="1100" kern="1200" dirty="0" smtClean="0"/>
+            <a:t> Vanessa (</a:t>
           </a:r>
           <a:r>
             <a:rPr lang="es-ES" sz="1100" kern="1200" dirty="0" smtClean="0"/>
@@ -13086,8 +13192,8 @@
         </a:p>
       </dsp:txBody>
       <dsp:txXfrm>
-        <a:off x="2207952" y="1624704"/>
-        <a:ext cx="2682307" cy="1609384"/>
+        <a:off x="2384967" y="1623854"/>
+        <a:ext cx="2683723" cy="1610234"/>
       </dsp:txXfrm>
     </dsp:sp>
     <dsp:sp modelId="{F4698590-C2B1-46ED-9C19-0246ACEEDEE6}">
@@ -13097,8 +13203,8 @@
       </dsp:nvSpPr>
       <dsp:spPr>
         <a:xfrm>
-          <a:off x="3656619" y="18005"/>
-          <a:ext cx="2682307" cy="1609384"/>
+          <a:off x="3834399" y="17161"/>
+          <a:ext cx="2683723" cy="1610234"/>
         </a:xfrm>
         <a:prstGeom prst="hexagon">
           <a:avLst/>
@@ -13178,7 +13284,27 @@
           </a:pPr>
           <a:r>
             <a:rPr lang="es-VE" sz="1100" kern="1200" dirty="0" smtClean="0"/>
-            <a:t>Urbina y Vera (2018) </a:t>
+            <a:t>Urbina José </a:t>
+          </a:r>
+          <a:r>
+            <a:rPr lang="es-VE" sz="1100" kern="1200" dirty="0" smtClean="0"/>
+            <a:t>y </a:t>
+          </a:r>
+          <a:r>
+            <a:rPr lang="es-VE" sz="1100" kern="1200" dirty="0" smtClean="0"/>
+            <a:t>Vera </a:t>
+          </a:r>
+          <a:r>
+            <a:rPr lang="es-VE" sz="1100" kern="1200" dirty="0" err="1" smtClean="0"/>
+            <a:t>Heysen</a:t>
+          </a:r>
+          <a:r>
+            <a:rPr lang="es-VE" sz="1100" kern="1200" dirty="0" smtClean="0"/>
+            <a:t> </a:t>
+          </a:r>
+          <a:r>
+            <a:rPr lang="es-VE" sz="1100" kern="1200" dirty="0" smtClean="0"/>
+            <a:t>(2018) </a:t>
           </a:r>
           <a:r>
             <a:rPr lang="es-ES" sz="1100" kern="1200" dirty="0" smtClean="0"/>
@@ -13196,8 +13322,8 @@
         </a:p>
       </dsp:txBody>
       <dsp:txXfrm>
-        <a:off x="3656619" y="18005"/>
-        <a:ext cx="2682307" cy="1609384"/>
+        <a:off x="3834399" y="17161"/>
+        <a:ext cx="2683723" cy="1610234"/>
       </dsp:txXfrm>
     </dsp:sp>
     <dsp:sp modelId="{28EA23FE-2DF9-4704-B2E0-7867444A6C7A}">
@@ -13207,8 +13333,8 @@
       </dsp:nvSpPr>
       <dsp:spPr>
         <a:xfrm>
-          <a:off x="779646" y="28162"/>
-          <a:ext cx="2682307" cy="1609384"/>
+          <a:off x="955907" y="27323"/>
+          <a:ext cx="2683723" cy="1610234"/>
         </a:xfrm>
         <a:prstGeom prst="hexagon">
           <a:avLst/>
@@ -13288,7 +13414,15 @@
           </a:pPr>
           <a:r>
             <a:rPr lang="es-ES" sz="1100" kern="1200" dirty="0" smtClean="0"/>
-            <a:t>González (2016) "</a:t>
+            <a:t>González </a:t>
+          </a:r>
+          <a:r>
+            <a:rPr lang="es-ES" sz="1100" kern="1200" dirty="0" smtClean="0"/>
+            <a:t>Carlos (2016</a:t>
+          </a:r>
+          <a:r>
+            <a:rPr lang="es-ES" sz="1100" kern="1200" dirty="0" smtClean="0"/>
+            <a:t>) "</a:t>
           </a:r>
           <a:r>
             <a:rPr lang="es-ES" sz="1100" b="1" kern="1200" dirty="0" smtClean="0"/>
@@ -13302,8 +13436,8 @@
         </a:p>
       </dsp:txBody>
       <dsp:txXfrm>
-        <a:off x="779646" y="28162"/>
-        <a:ext cx="2682307" cy="1609384"/>
+        <a:off x="955907" y="27323"/>
+        <a:ext cx="2683723" cy="1610234"/>
       </dsp:txXfrm>
     </dsp:sp>
   </dsp:spTree>
@@ -26580,7 +26714,7 @@
     </p:spTree>
     <p:extLst>
       <p:ext uri="{BB962C8B-B14F-4D97-AF65-F5344CB8AC3E}">
-        <p14:creationId xmlns="" xmlns:p14="http://schemas.microsoft.com/office/powerpoint/2010/main" val="60121150"/>
+        <p14:creationId xmlns:p14="http://schemas.microsoft.com/office/powerpoint/2010/main" xmlns="" val="60121150"/>
       </p:ext>
     </p:extLst>
   </p:cSld>
@@ -26845,7 +26979,7 @@
     </p:spTree>
     <p:extLst>
       <p:ext uri="{BB962C8B-B14F-4D97-AF65-F5344CB8AC3E}">
-        <p14:creationId xmlns="" xmlns:p14="http://schemas.microsoft.com/office/powerpoint/2010/main" val="3969051438"/>
+        <p14:creationId xmlns:p14="http://schemas.microsoft.com/office/powerpoint/2010/main" xmlns="" val="3969051438"/>
       </p:ext>
     </p:extLst>
   </p:cSld>
@@ -27056,7 +27190,7 @@
     </p:spTree>
     <p:extLst>
       <p:ext uri="{BB962C8B-B14F-4D97-AF65-F5344CB8AC3E}">
-        <p14:creationId xmlns="" xmlns:p14="http://schemas.microsoft.com/office/powerpoint/2010/main" val="2543840756"/>
+        <p14:creationId xmlns:p14="http://schemas.microsoft.com/office/powerpoint/2010/main" xmlns="" val="2543840756"/>
       </p:ext>
     </p:extLst>
   </p:cSld>
@@ -27176,7 +27310,7 @@
     </p:spTree>
     <p:extLst>
       <p:ext uri="{BB962C8B-B14F-4D97-AF65-F5344CB8AC3E}">
-        <p14:creationId xmlns="" xmlns:p14="http://schemas.microsoft.com/office/powerpoint/2010/main" val="1771242976"/>
+        <p14:creationId xmlns:p14="http://schemas.microsoft.com/office/powerpoint/2010/main" xmlns="" val="1771242976"/>
       </p:ext>
     </p:extLst>
   </p:cSld>
@@ -27296,7 +27430,7 @@
     </p:spTree>
     <p:extLst>
       <p:ext uri="{BB962C8B-B14F-4D97-AF65-F5344CB8AC3E}">
-        <p14:creationId xmlns="" xmlns:p14="http://schemas.microsoft.com/office/powerpoint/2010/main" val="1771242976"/>
+        <p14:creationId xmlns:p14="http://schemas.microsoft.com/office/powerpoint/2010/main" xmlns="" val="1771242976"/>
       </p:ext>
     </p:extLst>
   </p:cSld>
@@ -27416,7 +27550,7 @@
     </p:spTree>
     <p:extLst>
       <p:ext uri="{BB962C8B-B14F-4D97-AF65-F5344CB8AC3E}">
-        <p14:creationId xmlns="" xmlns:p14="http://schemas.microsoft.com/office/powerpoint/2010/main" val="1771242976"/>
+        <p14:creationId xmlns:p14="http://schemas.microsoft.com/office/powerpoint/2010/main" xmlns="" val="1771242976"/>
       </p:ext>
     </p:extLst>
   </p:cSld>
@@ -27536,7 +27670,7 @@
     </p:spTree>
     <p:extLst>
       <p:ext uri="{BB962C8B-B14F-4D97-AF65-F5344CB8AC3E}">
-        <p14:creationId xmlns="" xmlns:p14="http://schemas.microsoft.com/office/powerpoint/2010/main" val="1771242976"/>
+        <p14:creationId xmlns:p14="http://schemas.microsoft.com/office/powerpoint/2010/main" xmlns="" val="1771242976"/>
       </p:ext>
     </p:extLst>
   </p:cSld>
@@ -27656,7 +27790,7 @@
     </p:spTree>
     <p:extLst>
       <p:ext uri="{BB962C8B-B14F-4D97-AF65-F5344CB8AC3E}">
-        <p14:creationId xmlns="" xmlns:p14="http://schemas.microsoft.com/office/powerpoint/2010/main" val="1771242976"/>
+        <p14:creationId xmlns:p14="http://schemas.microsoft.com/office/powerpoint/2010/main" xmlns="" val="1771242976"/>
       </p:ext>
     </p:extLst>
   </p:cSld>
@@ -27776,7 +27910,7 @@
     </p:spTree>
     <p:extLst>
       <p:ext uri="{BB962C8B-B14F-4D97-AF65-F5344CB8AC3E}">
-        <p14:creationId xmlns="" xmlns:p14="http://schemas.microsoft.com/office/powerpoint/2010/main" val="1771242976"/>
+        <p14:creationId xmlns:p14="http://schemas.microsoft.com/office/powerpoint/2010/main" xmlns="" val="1771242976"/>
       </p:ext>
     </p:extLst>
   </p:cSld>
@@ -27896,7 +28030,127 @@
     </p:spTree>
     <p:extLst>
       <p:ext uri="{BB962C8B-B14F-4D97-AF65-F5344CB8AC3E}">
-        <p14:creationId xmlns="" xmlns:p14="http://schemas.microsoft.com/office/powerpoint/2010/main" val="1771242976"/>
+        <p14:creationId xmlns:p14="http://schemas.microsoft.com/office/powerpoint/2010/main" xmlns="" val="1771242976"/>
+      </p:ext>
+    </p:extLst>
+  </p:cSld>
+  <p:clrMapOvr>
+    <a:masterClrMapping/>
+  </p:clrMapOvr>
+</p:notes>
+</file>
+
+<file path=ppt/notesSlides/notesSlide9.xml><?xml version="1.0" encoding="utf-8"?>
+<p:notes xmlns:a="http://schemas.openxmlformats.org/drawingml/2006/main" xmlns:r="http://schemas.openxmlformats.org/officeDocument/2006/relationships" xmlns:p="http://schemas.openxmlformats.org/presentationml/2006/main">
+  <p:cSld>
+    <p:spTree>
+      <p:nvGrpSpPr>
+        <p:cNvPr id="1" name=""/>
+        <p:cNvGrpSpPr/>
+        <p:nvPr/>
+      </p:nvGrpSpPr>
+      <p:grpSpPr>
+        <a:xfrm>
+          <a:off x="0" y="0"/>
+          <a:ext cx="0" cy="0"/>
+          <a:chOff x="0" y="0"/>
+          <a:chExt cx="0" cy="0"/>
+        </a:xfrm>
+      </p:grpSpPr>
+      <p:sp>
+        <p:nvSpPr>
+          <p:cNvPr id="2" name="Marcador de imagen de diapositiva 1"/>
+          <p:cNvSpPr>
+            <a:spLocks noGrp="1" noRot="1" noChangeAspect="1"/>
+          </p:cNvSpPr>
+          <p:nvPr>
+            <p:ph type="sldImg"/>
+          </p:nvPr>
+        </p:nvSpPr>
+        <p:spPr/>
+      </p:sp>
+      <p:sp>
+        <p:nvSpPr>
+          <p:cNvPr id="3" name="Marcador de notas 2"/>
+          <p:cNvSpPr>
+            <a:spLocks noGrp="1"/>
+          </p:cNvSpPr>
+          <p:nvPr>
+            <p:ph type="body" idx="1"/>
+          </p:nvPr>
+        </p:nvSpPr>
+        <p:spPr/>
+        <p:txBody>
+          <a:bodyPr/>
+          <a:lstStyle/>
+          <a:p>
+            <a:endParaRPr lang="es-VE" dirty="0"/>
+          </a:p>
+        </p:txBody>
+      </p:sp>
+      <p:sp>
+        <p:nvSpPr>
+          <p:cNvPr id="4" name="Marcador de número de diapositiva 3"/>
+          <p:cNvSpPr>
+            <a:spLocks noGrp="1"/>
+          </p:cNvSpPr>
+          <p:nvPr>
+            <p:ph type="sldNum" sz="quarter" idx="10"/>
+          </p:nvPr>
+        </p:nvSpPr>
+        <p:spPr/>
+        <p:txBody>
+          <a:bodyPr/>
+          <a:lstStyle/>
+          <a:p>
+            <a:fld id="{0AF0A9AE-04EE-4404-88F6-369290B394A8}" type="slidenum">
+              <a:rPr lang="es-VE" smtClean="0"/>
+              <a:pPr/>
+              <a:t>9</a:t>
+            </a:fld>
+            <a:endParaRPr lang="es-VE" dirty="0"/>
+          </a:p>
+        </p:txBody>
+      </p:sp>
+      <p:sp>
+        <p:nvSpPr>
+          <p:cNvPr id="5" name="Marcador de pie de página 4"/>
+          <p:cNvSpPr>
+            <a:spLocks noGrp="1"/>
+          </p:cNvSpPr>
+          <p:nvPr>
+            <p:ph type="ftr" sz="quarter" idx="11"/>
+          </p:nvPr>
+        </p:nvSpPr>
+        <p:spPr/>
+        <p:txBody>
+          <a:bodyPr/>
+          <a:lstStyle/>
+          <a:p>
+            <a:r>
+              <a:rPr lang="pt-BR" dirty="0" err="1" smtClean="0"/>
+              <a:t>Br</a:t>
+            </a:r>
+            <a:r>
+              <a:rPr lang="pt-BR" dirty="0" smtClean="0"/>
+              <a:t> ARAGUACHE RICARDO &amp; </a:t>
+            </a:r>
+            <a:r>
+              <a:rPr lang="pt-BR" dirty="0" err="1" smtClean="0"/>
+              <a:t>Br</a:t>
+            </a:r>
+            <a:r>
+              <a:rPr lang="pt-BR" dirty="0" smtClean="0"/>
+              <a:t> ROJAS O</a:t>
+            </a:r>
+            <a:endParaRPr lang="es-VE" dirty="0"/>
+          </a:p>
+        </p:txBody>
+      </p:sp>
+    </p:spTree>
+    <p:extLst>
+      <p:ext uri="{BB962C8B-B14F-4D97-AF65-F5344CB8AC3E}">
+        <p14:creationId xmlns:p14="http://schemas.microsoft.com/office/powerpoint/2010/main" xmlns="" val="1771242976"/>
       </p:ext>
     </p:extLst>
   </p:cSld>
@@ -28525,7 +28779,7 @@
           </a:ln>
           <a:extLst>
             <a:ext uri="{91240B29-F687-4f45-9708-019B960494DF}">
-              <a14:hiddenLine xmlns:a14="http://schemas.microsoft.com/office/drawing/2010/main" xmlns="" w="9525">
+              <a14:hiddenLine xmlns="" xmlns:a14="http://schemas.microsoft.com/office/drawing/2010/main" w="9525">
                 <a:solidFill>
                   <a:srgbClr val="000000"/>
                 </a:solidFill>
@@ -28580,7 +28834,7 @@
           </a:ln>
           <a:extLst>
             <a:ext uri="{91240B29-F687-4f45-9708-019B960494DF}">
-              <a14:hiddenLine xmlns:a14="http://schemas.microsoft.com/office/drawing/2010/main" xmlns="" w="9525">
+              <a14:hiddenLine xmlns="" xmlns:a14="http://schemas.microsoft.com/office/drawing/2010/main" w="9525">
                 <a:solidFill>
                   <a:srgbClr val="000000"/>
                 </a:solidFill>
@@ -28595,7 +28849,7 @@
     </p:spTree>
     <p:extLst>
       <p:ext uri="{BB962C8B-B14F-4D97-AF65-F5344CB8AC3E}">
-        <p14:creationId xmlns="" xmlns:p14="http://schemas.microsoft.com/office/powerpoint/2010/main" val="962330776"/>
+        <p14:creationId xmlns:p14="http://schemas.microsoft.com/office/powerpoint/2010/main" xmlns="" val="962330776"/>
       </p:ext>
     </p:extLst>
   </p:cSld>
@@ -28891,7 +29145,7 @@
     </p:spTree>
     <p:extLst>
       <p:ext uri="{BB962C8B-B14F-4D97-AF65-F5344CB8AC3E}">
-        <p14:creationId xmlns="" xmlns:p14="http://schemas.microsoft.com/office/powerpoint/2010/main" val="3875060909"/>
+        <p14:creationId xmlns:p14="http://schemas.microsoft.com/office/powerpoint/2010/main" xmlns="" val="3875060909"/>
       </p:ext>
     </p:extLst>
   </p:cSld>
@@ -29144,7 +29398,7 @@
     </p:spTree>
     <p:extLst>
       <p:ext uri="{BB962C8B-B14F-4D97-AF65-F5344CB8AC3E}">
-        <p14:creationId xmlns="" xmlns:p14="http://schemas.microsoft.com/office/powerpoint/2010/main" val="824862993"/>
+        <p14:creationId xmlns:p14="http://schemas.microsoft.com/office/powerpoint/2010/main" xmlns="" val="824862993"/>
       </p:ext>
     </p:extLst>
   </p:cSld>
@@ -29689,7 +29943,7 @@
     </p:spTree>
     <p:extLst>
       <p:ext uri="{BB962C8B-B14F-4D97-AF65-F5344CB8AC3E}">
-        <p14:creationId xmlns="" xmlns:p14="http://schemas.microsoft.com/office/powerpoint/2010/main" val="130231458"/>
+        <p14:creationId xmlns:p14="http://schemas.microsoft.com/office/powerpoint/2010/main" xmlns="" val="130231458"/>
       </p:ext>
     </p:extLst>
   </p:cSld>
@@ -29942,7 +30196,7 @@
     </p:spTree>
     <p:extLst>
       <p:ext uri="{BB962C8B-B14F-4D97-AF65-F5344CB8AC3E}">
-        <p14:creationId xmlns="" xmlns:p14="http://schemas.microsoft.com/office/powerpoint/2010/main" val="2246976171"/>
+        <p14:creationId xmlns:p14="http://schemas.microsoft.com/office/powerpoint/2010/main" xmlns="" val="2246976171"/>
       </p:ext>
     </p:extLst>
   </p:cSld>
@@ -30479,7 +30733,7 @@
     </p:spTree>
     <p:extLst>
       <p:ext uri="{BB962C8B-B14F-4D97-AF65-F5344CB8AC3E}">
-        <p14:creationId xmlns="" xmlns:p14="http://schemas.microsoft.com/office/powerpoint/2010/main" val="2570563527"/>
+        <p14:creationId xmlns:p14="http://schemas.microsoft.com/office/powerpoint/2010/main" xmlns="" val="2570563527"/>
       </p:ext>
     </p:extLst>
   </p:cSld>
@@ -30781,7 +31035,7 @@
     </p:spTree>
     <p:extLst>
       <p:ext uri="{BB962C8B-B14F-4D97-AF65-F5344CB8AC3E}">
-        <p14:creationId xmlns="" xmlns:p14="http://schemas.microsoft.com/office/powerpoint/2010/main" val="865215572"/>
+        <p14:creationId xmlns:p14="http://schemas.microsoft.com/office/powerpoint/2010/main" xmlns="" val="865215572"/>
       </p:ext>
     </p:extLst>
   </p:cSld>
@@ -30960,7 +31214,7 @@
     </p:spTree>
     <p:extLst>
       <p:ext uri="{BB962C8B-B14F-4D97-AF65-F5344CB8AC3E}">
-        <p14:creationId xmlns="" xmlns:p14="http://schemas.microsoft.com/office/powerpoint/2010/main" val="983244148"/>
+        <p14:creationId xmlns:p14="http://schemas.microsoft.com/office/powerpoint/2010/main" xmlns="" val="983244148"/>
       </p:ext>
     </p:extLst>
   </p:cSld>
@@ -31145,7 +31399,7 @@
     </p:spTree>
     <p:extLst>
       <p:ext uri="{BB962C8B-B14F-4D97-AF65-F5344CB8AC3E}">
-        <p14:creationId xmlns="" xmlns:p14="http://schemas.microsoft.com/office/powerpoint/2010/main" val="3103191099"/>
+        <p14:creationId xmlns:p14="http://schemas.microsoft.com/office/powerpoint/2010/main" xmlns="" val="3103191099"/>
       </p:ext>
     </p:extLst>
   </p:cSld>
@@ -31345,7 +31599,7 @@
     </p:spTree>
     <p:extLst>
       <p:ext uri="{BB962C8B-B14F-4D97-AF65-F5344CB8AC3E}">
-        <p14:creationId xmlns="" xmlns:p14="http://schemas.microsoft.com/office/powerpoint/2010/main" val="3827910317"/>
+        <p14:creationId xmlns:p14="http://schemas.microsoft.com/office/powerpoint/2010/main" xmlns="" val="3827910317"/>
       </p:ext>
     </p:extLst>
   </p:cSld>
@@ -31601,7 +31855,7 @@
     </p:spTree>
     <p:extLst>
       <p:ext uri="{BB962C8B-B14F-4D97-AF65-F5344CB8AC3E}">
-        <p14:creationId xmlns="" xmlns:p14="http://schemas.microsoft.com/office/powerpoint/2010/main" val="501827806"/>
+        <p14:creationId xmlns:p14="http://schemas.microsoft.com/office/powerpoint/2010/main" xmlns="" val="501827806"/>
       </p:ext>
     </p:extLst>
   </p:cSld>
@@ -31903,7 +32157,7 @@
     </p:spTree>
     <p:extLst>
       <p:ext uri="{BB962C8B-B14F-4D97-AF65-F5344CB8AC3E}">
-        <p14:creationId xmlns="" xmlns:p14="http://schemas.microsoft.com/office/powerpoint/2010/main" val="2722369882"/>
+        <p14:creationId xmlns:p14="http://schemas.microsoft.com/office/powerpoint/2010/main" xmlns="" val="2722369882"/>
       </p:ext>
     </p:extLst>
   </p:cSld>
@@ -32350,7 +32604,7 @@
     </p:spTree>
     <p:extLst>
       <p:ext uri="{BB962C8B-B14F-4D97-AF65-F5344CB8AC3E}">
-        <p14:creationId xmlns="" xmlns:p14="http://schemas.microsoft.com/office/powerpoint/2010/main" val="3983954288"/>
+        <p14:creationId xmlns:p14="http://schemas.microsoft.com/office/powerpoint/2010/main" xmlns="" val="3983954288"/>
       </p:ext>
     </p:extLst>
   </p:cSld>
@@ -32473,7 +32727,7 @@
     </p:spTree>
     <p:extLst>
       <p:ext uri="{BB962C8B-B14F-4D97-AF65-F5344CB8AC3E}">
-        <p14:creationId xmlns="" xmlns:p14="http://schemas.microsoft.com/office/powerpoint/2010/main" val="675596223"/>
+        <p14:creationId xmlns:p14="http://schemas.microsoft.com/office/powerpoint/2010/main" xmlns="" val="675596223"/>
       </p:ext>
     </p:extLst>
   </p:cSld>
@@ -32573,7 +32827,7 @@
     </p:spTree>
     <p:extLst>
       <p:ext uri="{BB962C8B-B14F-4D97-AF65-F5344CB8AC3E}">
-        <p14:creationId xmlns="" xmlns:p14="http://schemas.microsoft.com/office/powerpoint/2010/main" val="1724918196"/>
+        <p14:creationId xmlns:p14="http://schemas.microsoft.com/office/powerpoint/2010/main" xmlns="" val="1724918196"/>
       </p:ext>
     </p:extLst>
   </p:cSld>
@@ -32861,7 +33115,7 @@
     </p:spTree>
     <p:extLst>
       <p:ext uri="{BB962C8B-B14F-4D97-AF65-F5344CB8AC3E}">
-        <p14:creationId xmlns="" xmlns:p14="http://schemas.microsoft.com/office/powerpoint/2010/main" val="4279814297"/>
+        <p14:creationId xmlns:p14="http://schemas.microsoft.com/office/powerpoint/2010/main" xmlns="" val="4279814297"/>
       </p:ext>
     </p:extLst>
   </p:cSld>
@@ -33157,7 +33411,7 @@
     </p:spTree>
     <p:extLst>
       <p:ext uri="{BB962C8B-B14F-4D97-AF65-F5344CB8AC3E}">
-        <p14:creationId xmlns="" xmlns:p14="http://schemas.microsoft.com/office/powerpoint/2010/main" val="4004667922"/>
+        <p14:creationId xmlns:p14="http://schemas.microsoft.com/office/powerpoint/2010/main" xmlns="" val="4004667922"/>
       </p:ext>
     </p:extLst>
   </p:cSld>
@@ -33731,7 +33985,7 @@
     </p:spTree>
     <p:extLst>
       <p:ext uri="{BB962C8B-B14F-4D97-AF65-F5344CB8AC3E}">
-        <p14:creationId xmlns="" xmlns:p14="http://schemas.microsoft.com/office/powerpoint/2010/main" val="4239018071"/>
+        <p14:creationId xmlns:p14="http://schemas.microsoft.com/office/powerpoint/2010/main" xmlns="" val="4239018071"/>
       </p:ext>
     </p:extLst>
   </p:cSld>
@@ -34201,7 +34455,7 @@
         </p:nvSpPr>
         <p:spPr>
           <a:xfrm>
-            <a:off x="1303018" y="1163782"/>
+            <a:off x="1582150" y="1163782"/>
             <a:ext cx="6096000" cy="1015663"/>
           </a:xfrm>
           <a:prstGeom prst="rect">
@@ -34280,7 +34534,7 @@
             <a:lum bright="20000" contrast="20000"/>
             <a:extLst>
               <a:ext uri="{28A0092B-C50C-407E-A947-70E740481C1C}">
-                <a14:useLocalDpi xmlns="" xmlns:a14="http://schemas.microsoft.com/office/drawing/2010/main" val="0"/>
+                <a14:useLocalDpi xmlns:a14="http://schemas.microsoft.com/office/drawing/2010/main" xmlns="" val="0"/>
               </a:ext>
             </a:extLst>
           </a:blip>
@@ -34569,7 +34823,7 @@
     </p:spTree>
     <p:extLst>
       <p:ext uri="{BB962C8B-B14F-4D97-AF65-F5344CB8AC3E}">
-        <p14:creationId xmlns="" xmlns:p14="http://schemas.microsoft.com/office/powerpoint/2010/main" val="2338215153"/>
+        <p14:creationId xmlns:p14="http://schemas.microsoft.com/office/powerpoint/2010/main" xmlns="" val="2338215153"/>
       </p:ext>
     </p:extLst>
   </p:cSld>
@@ -34792,7 +35046,7 @@
     </p:spTree>
     <p:extLst>
       <p:ext uri="{BB962C8B-B14F-4D97-AF65-F5344CB8AC3E}">
-        <p14:creationId xmlns="" xmlns:p14="http://schemas.microsoft.com/office/powerpoint/2010/main" val="2155189984"/>
+        <p14:creationId xmlns:p14="http://schemas.microsoft.com/office/powerpoint/2010/main" xmlns="" val="2155189984"/>
       </p:ext>
     </p:extLst>
   </p:cSld>
@@ -35182,7 +35436,7 @@
     </p:spTree>
     <p:extLst>
       <p:ext uri="{BB962C8B-B14F-4D97-AF65-F5344CB8AC3E}">
-        <p14:creationId xmlns="" xmlns:p14="http://schemas.microsoft.com/office/powerpoint/2010/main" val="2155189984"/>
+        <p14:creationId xmlns:p14="http://schemas.microsoft.com/office/powerpoint/2010/main" xmlns="" val="2155189984"/>
       </p:ext>
     </p:extLst>
   </p:cSld>
@@ -35513,7 +35767,7 @@
     </p:spTree>
     <p:extLst>
       <p:ext uri="{BB962C8B-B14F-4D97-AF65-F5344CB8AC3E}">
-        <p14:creationId xmlns="" xmlns:p14="http://schemas.microsoft.com/office/powerpoint/2010/main" val="2155189984"/>
+        <p14:creationId xmlns:p14="http://schemas.microsoft.com/office/powerpoint/2010/main" xmlns="" val="2155189984"/>
       </p:ext>
     </p:extLst>
   </p:cSld>
@@ -36213,8 +36467,8 @@
           <p:nvPr/>
         </p:nvGraphicFramePr>
         <p:xfrm>
-          <a:off x="510139" y="2521818"/>
-          <a:ext cx="8402855" cy="3234089"/>
+          <a:off x="154005" y="2521818"/>
+          <a:ext cx="8758990" cy="3234089"/>
         </p:xfrm>
         <a:graphic>
           <a:graphicData uri="http://schemas.openxmlformats.org/drawingml/2006/diagram">
@@ -36345,7 +36599,7 @@
     </p:spTree>
     <p:extLst>
       <p:ext uri="{BB962C8B-B14F-4D97-AF65-F5344CB8AC3E}">
-        <p14:creationId xmlns="" xmlns:p14="http://schemas.microsoft.com/office/powerpoint/2010/main" val="2155189984"/>
+        <p14:creationId xmlns:p14="http://schemas.microsoft.com/office/powerpoint/2010/main" xmlns="" val="2155189984"/>
       </p:ext>
     </p:extLst>
   </p:cSld>
@@ -36799,10 +37053,6 @@
               </a:rPr>
               <a:t>CSS</a:t>
             </a:r>
-            <a:endParaRPr lang="es-ES" sz="1400" b="1" i="1" dirty="0" smtClean="0">
-              <a:latin typeface="Arial" pitchFamily="34" charset="0"/>
-              <a:cs typeface="Arial" pitchFamily="34" charset="0"/>
-            </a:endParaRPr>
           </a:p>
           <a:p>
             <a:pPr lvl="0" algn="ctr"/>
@@ -37043,28 +37293,7 @@
                 <a:latin typeface="Arial" pitchFamily="34" charset="0"/>
                 <a:cs typeface="Arial" pitchFamily="34" charset="0"/>
               </a:rPr>
-              <a:t>Uso de </a:t>
-            </a:r>
-            <a:r>
-              <a:rPr lang="es-VE" sz="1050" b="1" dirty="0" smtClean="0">
-                <a:latin typeface="Arial" pitchFamily="34" charset="0"/>
-                <a:cs typeface="Arial" pitchFamily="34" charset="0"/>
-              </a:rPr>
-              <a:t>AJAX para </a:t>
-            </a:r>
-            <a:r>
-              <a:rPr lang="es-VE" sz="1050" b="1" dirty="0" smtClean="0">
-                <a:latin typeface="Arial" pitchFamily="34" charset="0"/>
-                <a:cs typeface="Arial" pitchFamily="34" charset="0"/>
-              </a:rPr>
-              <a:t>consultas cliente-servidor sin los retardos de una petición </a:t>
-            </a:r>
-            <a:r>
-              <a:rPr lang="es-VE" sz="1050" b="1" dirty="0" smtClean="0">
-                <a:latin typeface="Arial" pitchFamily="34" charset="0"/>
-                <a:cs typeface="Arial" pitchFamily="34" charset="0"/>
-              </a:rPr>
-              <a:t>HTML usual</a:t>
+              <a:t>Uso de AJAX para consultas cliente-servidor sin los retardos de una petición HTML usual</a:t>
             </a:r>
           </a:p>
           <a:p>
@@ -37261,14 +37490,7 @@
                 <a:latin typeface="Arial" pitchFamily="34" charset="0"/>
                 <a:cs typeface="Arial" pitchFamily="34" charset="0"/>
               </a:rPr>
-              <a:t>Licencia GNU </a:t>
-            </a:r>
-            <a:r>
-              <a:rPr lang="es-VE" sz="1500" b="1" dirty="0" smtClean="0">
-                <a:latin typeface="Arial" pitchFamily="34" charset="0"/>
-                <a:cs typeface="Arial" pitchFamily="34" charset="0"/>
-              </a:rPr>
-              <a:t>GPL</a:t>
+              <a:t>Licencia GNU GPL</a:t>
             </a:r>
           </a:p>
           <a:p>
@@ -37295,7 +37517,7 @@
     </p:spTree>
     <p:extLst>
       <p:ext uri="{BB962C8B-B14F-4D97-AF65-F5344CB8AC3E}">
-        <p14:creationId xmlns="" xmlns:p14="http://schemas.microsoft.com/office/powerpoint/2010/main" val="2155189984"/>
+        <p14:creationId xmlns:p14="http://schemas.microsoft.com/office/powerpoint/2010/main" xmlns="" val="2155189984"/>
       </p:ext>
     </p:extLst>
   </p:cSld>
@@ -38153,7 +38375,7 @@
     </p:spTree>
     <p:extLst>
       <p:ext uri="{BB962C8B-B14F-4D97-AF65-F5344CB8AC3E}">
-        <p14:creationId xmlns="" xmlns:p14="http://schemas.microsoft.com/office/powerpoint/2010/main" val="2155189984"/>
+        <p14:creationId xmlns:p14="http://schemas.microsoft.com/office/powerpoint/2010/main" xmlns="" val="2155189984"/>
       </p:ext>
     </p:extLst>
   </p:cSld>
@@ -38954,7 +39176,7 @@
     </p:spTree>
     <p:extLst>
       <p:ext uri="{BB962C8B-B14F-4D97-AF65-F5344CB8AC3E}">
-        <p14:creationId xmlns="" xmlns:p14="http://schemas.microsoft.com/office/powerpoint/2010/main" val="2155189984"/>
+        <p14:creationId xmlns:p14="http://schemas.microsoft.com/office/powerpoint/2010/main" xmlns="" val="2155189984"/>
       </p:ext>
     </p:extLst>
   </p:cSld>
@@ -39919,6 +40141,191 @@
 </p:sld>
 </file>
 
+<file path=ppt/slides/slide9.xml><?xml version="1.0" encoding="utf-8"?>
+<p:sld xmlns:a="http://schemas.openxmlformats.org/drawingml/2006/main" xmlns:r="http://schemas.openxmlformats.org/officeDocument/2006/relationships" xmlns:p="http://schemas.openxmlformats.org/presentationml/2006/main" showMasterSp="0">
+  <p:cSld>
+    <p:spTree>
+      <p:nvGrpSpPr>
+        <p:cNvPr id="1" name=""/>
+        <p:cNvGrpSpPr/>
+        <p:nvPr/>
+      </p:nvGrpSpPr>
+      <p:grpSpPr>
+        <a:xfrm>
+          <a:off x="0" y="0"/>
+          <a:ext cx="0" cy="0"/>
+          <a:chOff x="0" y="0"/>
+          <a:chExt cx="0" cy="0"/>
+        </a:xfrm>
+      </p:grpSpPr>
+      <p:sp>
+        <p:nvSpPr>
+          <p:cNvPr id="56" name="Marcador de número de diapositiva 55"/>
+          <p:cNvSpPr>
+            <a:spLocks noGrp="1"/>
+          </p:cNvSpPr>
+          <p:nvPr>
+            <p:ph type="sldNum" sz="quarter" idx="12"/>
+          </p:nvPr>
+        </p:nvSpPr>
+        <p:spPr>
+          <a:ln>
+            <a:noFill/>
+          </a:ln>
+        </p:spPr>
+        <p:txBody>
+          <a:bodyPr/>
+          <a:lstStyle/>
+          <a:p>
+            <a:fld id="{23259D8E-0E7B-4C06-AAFC-E14D83EC71EC}" type="slidenum">
+              <a:rPr lang="es-VE" sz="1200" smtClean="0">
+                <a:latin typeface="Arial" panose="020B0604020202020204" pitchFamily="34" charset="0"/>
+                <a:cs typeface="Arial" panose="020B0604020202020204" pitchFamily="34" charset="0"/>
+              </a:rPr>
+              <a:pPr/>
+              <a:t>9</a:t>
+            </a:fld>
+            <a:endParaRPr lang="es-VE" sz="1200" dirty="0">
+              <a:latin typeface="Arial" panose="020B0604020202020204" pitchFamily="34" charset="0"/>
+              <a:cs typeface="Arial" panose="020B0604020202020204" pitchFamily="34" charset="0"/>
+            </a:endParaRPr>
+          </a:p>
+        </p:txBody>
+      </p:sp>
+      <p:sp>
+        <p:nvSpPr>
+          <p:cNvPr id="31" name="CuadroTexto 30"/>
+          <p:cNvSpPr txBox="1"/>
+          <p:nvPr/>
+        </p:nvSpPr>
+        <p:spPr>
+          <a:xfrm>
+            <a:off x="3286462" y="1370685"/>
+            <a:ext cx="2743200" cy="369332"/>
+          </a:xfrm>
+          <a:prstGeom prst="rect">
+            <a:avLst/>
+          </a:prstGeom>
+          <a:noFill/>
+        </p:spPr>
+        <p:txBody>
+          <a:bodyPr wrap="square" rtlCol="0">
+            <a:spAutoFit/>
+          </a:bodyPr>
+          <a:lstStyle/>
+          <a:p>
+            <a:pPr algn="ctr"/>
+            <a:r>
+              <a:rPr lang="es-US" b="1" dirty="0" smtClean="0">
+                <a:latin typeface="Arial" panose="020B0604020202020204" pitchFamily="34" charset="0"/>
+                <a:cs typeface="Arial" panose="020B0604020202020204" pitchFamily="34" charset="0"/>
+              </a:rPr>
+              <a:t> </a:t>
+            </a:r>
+            <a:r>
+              <a:rPr lang="es-US" b="1" dirty="0" smtClean="0">
+                <a:latin typeface="Arial" panose="020B0604020202020204" pitchFamily="34" charset="0"/>
+                <a:cs typeface="Arial" panose="020B0604020202020204" pitchFamily="34" charset="0"/>
+              </a:rPr>
+              <a:t> ¡</a:t>
+            </a:r>
+            <a:r>
+              <a:rPr lang="es-US" b="1" dirty="0" smtClean="0">
+                <a:latin typeface="Arial" panose="020B0604020202020204" pitchFamily="34" charset="0"/>
+                <a:cs typeface="Arial" panose="020B0604020202020204" pitchFamily="34" charset="0"/>
+              </a:rPr>
+              <a:t>MUCHAS GRACIAS!</a:t>
+            </a:r>
+            <a:r>
+              <a:rPr lang="es-US" dirty="0" smtClean="0"/>
+              <a:t> </a:t>
+            </a:r>
+            <a:endParaRPr lang="es-VE" dirty="0"/>
+          </a:p>
+        </p:txBody>
+      </p:sp>
+      <p:sp>
+        <p:nvSpPr>
+          <p:cNvPr id="9" name="8 Rectángulo"/>
+          <p:cNvSpPr/>
+          <p:nvPr/>
+        </p:nvSpPr>
+        <p:spPr>
+          <a:xfrm>
+            <a:off x="2387703" y="5212724"/>
+            <a:ext cx="4572000" cy="369332"/>
+          </a:xfrm>
+          <a:prstGeom prst="rect">
+            <a:avLst/>
+          </a:prstGeom>
+        </p:spPr>
+        <p:txBody>
+          <a:bodyPr>
+            <a:spAutoFit/>
+          </a:bodyPr>
+          <a:lstStyle/>
+          <a:p>
+            <a:pPr algn="ctr"/>
+            <a:r>
+              <a:rPr lang="es-ES" b="1" dirty="0" smtClean="0">
+                <a:latin typeface="Arial" pitchFamily="34" charset="0"/>
+                <a:cs typeface="Arial" pitchFamily="34" charset="0"/>
+              </a:rPr>
+              <a:t>Preguntas</a:t>
+            </a:r>
+            <a:endParaRPr lang="es-ES" dirty="0"/>
+          </a:p>
+        </p:txBody>
+      </p:sp>
+      <p:pic>
+        <p:nvPicPr>
+          <p:cNvPr id="1027" name="Picture 3" descr="C:\Program Files (x86)\Microsoft Office\MEDIA\CAGCAT10\j0302953.jpg"/>
+          <p:cNvPicPr>
+            <a:picLocks noChangeAspect="1" noChangeArrowheads="1"/>
+          </p:cNvPicPr>
+          <p:nvPr/>
+        </p:nvPicPr>
+        <p:blipFill>
+          <a:blip r:embed="rId3" cstate="print"/>
+          <a:srcRect/>
+          <a:stretch>
+            <a:fillRect/>
+          </a:stretch>
+        </p:blipFill>
+        <p:spPr bwMode="auto">
+          <a:xfrm>
+            <a:off x="3487985" y="1762392"/>
+            <a:ext cx="2248463" cy="3151131"/>
+          </a:xfrm>
+          <a:prstGeom prst="rect">
+            <a:avLst/>
+          </a:prstGeom>
+          <a:noFill/>
+        </p:spPr>
+      </p:pic>
+    </p:spTree>
+    <p:extLst>
+      <p:ext uri="{BB962C8B-B14F-4D97-AF65-F5344CB8AC3E}">
+        <p14:creationId xmlns:p14="http://schemas.microsoft.com/office/powerpoint/2010/main" xmlns="" val="2155189984"/>
+      </p:ext>
+    </p:extLst>
+  </p:cSld>
+  <p:clrMapOvr>
+    <a:masterClrMapping/>
+  </p:clrMapOvr>
+  <p:transition spd="med">
+    <p:circle/>
+  </p:transition>
+  <p:timing>
+    <p:tnLst>
+      <p:par>
+        <p:cTn id="1" dur="indefinite" restart="never" nodeType="tmRoot"/>
+      </p:par>
+    </p:tnLst>
+  </p:timing>
+</p:sld>
+</file>
+
 <file path=ppt/theme/theme1.xml><?xml version="1.0" encoding="utf-8"?>
 <a:theme xmlns:a="http://schemas.openxmlformats.org/drawingml/2006/main" name="Parallax">
   <a:themeElements>
@@ -40169,7 +40576,7 @@
   <a:extraClrSchemeLst/>
   <a:extLst>
     <a:ext uri="{05A4C25C-085E-4340-85A3-A5531E510DB2}">
-      <thm15:themeFamily xmlns="" xmlns:thm15="http://schemas.microsoft.com/office/thememl/2012/main" name="Parallax" id="{3388167B-A2EB-4685-9635-1831D9AEF8C4}" vid="{4F7A876A-7598-49CA-AFC8-8EDA2551E4A7}"/>
+      <thm15:themeFamily xmlns:thm15="http://schemas.microsoft.com/office/thememl/2012/main" xmlns="" name="Parallax" id="{3388167B-A2EB-4685-9635-1831D9AEF8C4}" vid="{4F7A876A-7598-49CA-AFC8-8EDA2551E4A7}"/>
     </a:ext>
   </a:extLst>
 </a:theme>
@@ -40430,7 +40837,7 @@
   <a:extraClrSchemeLst/>
   <a:extLst>
     <a:ext uri="{05A4C25C-085E-4340-85A3-A5531E510DB2}">
-      <thm15:themeFamily xmlns="" xmlns:thm15="http://schemas.microsoft.com/office/thememl/2012/main" name="Office Theme" id="{62F939B6-93AF-4DB8-9C6B-D6C7DFDC589F}" vid="{4A3C46E8-61CC-4603-A589-7422A47A8E4A}"/>
+      <thm15:themeFamily xmlns:thm15="http://schemas.microsoft.com/office/thememl/2012/main" xmlns="" name="Office Theme" id="{62F939B6-93AF-4DB8-9C6B-D6C7DFDC589F}" vid="{4A3C46E8-61CC-4603-A589-7422A47A8E4A}"/>
     </a:ext>
   </a:extLst>
 </a:theme>
@@ -40691,7 +41098,7 @@
   <a:extraClrSchemeLst/>
   <a:extLst>
     <a:ext uri="{05A4C25C-085E-4340-85A3-A5531E510DB2}">
-      <thm15:themeFamily xmlns="" xmlns:thm15="http://schemas.microsoft.com/office/thememl/2012/main" name="Office Theme" id="{62F939B6-93AF-4DB8-9C6B-D6C7DFDC589F}" vid="{4A3C46E8-61CC-4603-A589-7422A47A8E4A}"/>
+      <thm15:themeFamily xmlns:thm15="http://schemas.microsoft.com/office/thememl/2012/main" xmlns="" name="Office Theme" id="{62F939B6-93AF-4DB8-9C6B-D6C7DFDC589F}" vid="{4A3C46E8-61CC-4603-A589-7422A47A8E4A}"/>
     </a:ext>
   </a:extLst>
 </a:theme>

</xml_diff>